<commit_message>
feat: update Identificador and DocumentData types to enforce certificateYear as a string and add year field
</commit_message>
<xml_diff>
--- a/public/templates/frente.pptx
+++ b/public/templates/frente.pptx
@@ -3757,12 +3757,12 @@
                 <a:uFillTx/>
                 <a:latin typeface="Arial"/>
               </a:rPr>
-              <a:t>funcionário(a), portador(a) do CPF: [</a:t>
+              <a:t>funcionário(a), portador(a) do CPF: </a:t>
             </a:r>
             <a:r>
               <a:rPr lang="pt-BR" sz="1000" dirty="0" err="1">
                 <a:solidFill>
-                  <a:srgbClr val="000000"/>
+                  <a:srgbClr val="FF0000"/>
                 </a:solidFill>
                 <a:latin typeface="Arial"/>
               </a:rPr>
@@ -3776,17 +3776,7 @@
                 <a:uFillTx/>
                 <a:latin typeface="Arial"/>
               </a:rPr>
-              <a:t>], concluiu o treinamento de capacitação profissional, conforme a </a:t>
-            </a:r>
-            <a:r>
-              <a:rPr lang="pt-BR" sz="1000" b="1" u="none" strike="noStrike" dirty="0">
-                <a:solidFill>
-                  <a:srgbClr val="000000"/>
-                </a:solidFill>
-                <a:uFillTx/>
-                <a:latin typeface="Arial"/>
-              </a:rPr>
-              <a:t>[</a:t>
+              <a:t>, concluiu o treinamento de capacitação profissional, conforme a </a:t>
             </a:r>
             <a:r>
               <a:rPr lang="pt-BR" sz="1000" b="1" dirty="0" err="1">
@@ -3808,16 +3798,6 @@
               <a:t>_treinamento</a:t>
             </a:r>
             <a:r>
-              <a:rPr lang="pt-BR" sz="1000" b="1" u="none" strike="noStrike" dirty="0">
-                <a:solidFill>
-                  <a:srgbClr val="000000"/>
-                </a:solidFill>
-                <a:uFillTx/>
-                <a:latin typeface="Arial"/>
-              </a:rPr>
-              <a:t>]</a:t>
-            </a:r>
-            <a:r>
               <a:rPr lang="pt-BR" sz="1000" b="0" u="none" strike="noStrike" dirty="0">
                 <a:solidFill>
                   <a:srgbClr val="000000"/>
@@ -3828,19 +3808,9 @@
               <a:t>, regulamentada pela </a:t>
             </a:r>
             <a:r>
-              <a:rPr lang="pt-BR" sz="1000" b="1" u="none" strike="noStrike" dirty="0">
-                <a:solidFill>
-                  <a:srgbClr val="000000"/>
-                </a:solidFill>
-                <a:uFillTx/>
-                <a:latin typeface="Arial"/>
-              </a:rPr>
-              <a:t>[</a:t>
-            </a:r>
-            <a:r>
               <a:rPr lang="pt-BR" sz="1000" b="1" u="none" strike="noStrike" dirty="0" err="1">
                 <a:solidFill>
-                  <a:srgbClr val="000000"/>
+                  <a:srgbClr val="FF0000"/>
                 </a:solidFill>
                 <a:uFillTx/>
                 <a:latin typeface="Arial"/>
@@ -3848,24 +3818,24 @@
               <a:t>portaria_treinamento</a:t>
             </a:r>
             <a:r>
-              <a:rPr lang="pt-BR" sz="1000" b="1" u="none" strike="noStrike" dirty="0">
-                <a:solidFill>
-                  <a:srgbClr val="000000"/>
-                </a:solidFill>
-                <a:uFillTx/>
-                <a:latin typeface="Arial"/>
-              </a:rPr>
-              <a:t>]</a:t>
-            </a:r>
-            <a:r>
               <a:rPr lang="pt-BR" sz="1000" b="0" u="none" strike="noStrike" dirty="0">
                 <a:solidFill>
-                  <a:srgbClr val="000000"/>
-                </a:solidFill>
-                <a:uFillTx/>
-                <a:latin typeface="Arial"/>
-              </a:rPr>
-              <a:t>. Este treinamento foi patrocinado pela empresa [empresa], inscrita no CNPJ: [</a:t>
+                  <a:srgbClr val="FF0000"/>
+                </a:solidFill>
+                <a:uFillTx/>
+                <a:latin typeface="Arial"/>
+              </a:rPr>
+              <a:t> </a:t>
+            </a:r>
+            <a:r>
+              <a:rPr lang="pt-BR" sz="1000" b="0" u="none" strike="noStrike" dirty="0">
+                <a:solidFill>
+                  <a:srgbClr val="000000"/>
+                </a:solidFill>
+                <a:uFillTx/>
+                <a:latin typeface="Arial"/>
+              </a:rPr>
+              <a:t>Este treinamento foi patrocinado pela empresa </a:t>
             </a:r>
             <a:r>
               <a:rPr lang="pt-BR" sz="1000" b="0" u="none" strike="noStrike" dirty="0" err="1">
@@ -3875,6 +3845,26 @@
                 <a:uFillTx/>
                 <a:latin typeface="Arial"/>
               </a:rPr>
+              <a:t>empresa</a:t>
+            </a:r>
+            <a:r>
+              <a:rPr lang="pt-BR" sz="1000" b="0" u="none" strike="noStrike" dirty="0">
+                <a:solidFill>
+                  <a:srgbClr val="000000"/>
+                </a:solidFill>
+                <a:uFillTx/>
+                <a:latin typeface="Arial"/>
+              </a:rPr>
+              <a:t>, inscrita no CNPJ: </a:t>
+            </a:r>
+            <a:r>
+              <a:rPr lang="pt-BR" sz="1000" b="0" u="none" strike="noStrike" dirty="0" err="1">
+                <a:solidFill>
+                  <a:srgbClr val="000000"/>
+                </a:solidFill>
+                <a:uFillTx/>
+                <a:latin typeface="Arial"/>
+              </a:rPr>
               <a:t>cnpj</a:t>
             </a:r>
             <a:r>
@@ -3885,7 +3875,16 @@
                 <a:uFillTx/>
                 <a:latin typeface="Arial"/>
               </a:rPr>
-              <a:t>], e realizado no dia </a:t>
+              <a:t>, e realizado no dia </a:t>
+            </a:r>
+            <a:r>
+              <a:rPr lang="pt-BR" sz="1000" dirty="0" err="1">
+                <a:solidFill>
+                  <a:srgbClr val="000000"/>
+                </a:solidFill>
+                <a:latin typeface="Arial"/>
+              </a:rPr>
+              <a:t>data_realizada</a:t>
             </a:r>
             <a:r>
               <a:rPr lang="pt-BR" sz="1000" dirty="0">
@@ -3894,16 +3893,17 @@
                 </a:solidFill>
                 <a:latin typeface="Arial"/>
               </a:rPr>
-              <a:t>[</a:t>
-            </a:r>
-            <a:r>
-              <a:rPr lang="pt-BR" sz="1000" dirty="0" err="1">
-                <a:solidFill>
-                  <a:srgbClr val="000000"/>
-                </a:solidFill>
-                <a:latin typeface="Arial"/>
-              </a:rPr>
-              <a:t>data_realizada</a:t>
+              <a:t>,</a:t>
+            </a:r>
+            <a:r>
+              <a:rPr lang="pt-BR" sz="1000" b="0" u="none" strike="noStrike" dirty="0">
+                <a:solidFill>
+                  <a:srgbClr val="000000"/>
+                </a:solidFill>
+                <a:uFillTx/>
+                <a:latin typeface="Arial"/>
+              </a:rPr>
+              <a:t> das r_hora</a:t>
             </a:r>
             <a:r>
               <a:rPr lang="pt-BR" sz="1000" dirty="0">
@@ -3912,7 +3912,7 @@
                 </a:solidFill>
                 <a:latin typeface="Arial"/>
               </a:rPr>
-              <a:t>],</a:t>
+              <a:t>_1</a:t>
             </a:r>
             <a:r>
               <a:rPr lang="pt-BR" sz="1000" b="0" u="none" strike="noStrike" dirty="0">
@@ -3922,7 +3922,7 @@
                 <a:uFillTx/>
                 <a:latin typeface="Arial"/>
               </a:rPr>
-              <a:t> das [r_hora</a:t>
+              <a:t> às r_</a:t>
             </a:r>
             <a:r>
               <a:rPr lang="pt-BR" sz="1000" dirty="0">
@@ -3931,7 +3931,7 @@
                 </a:solidFill>
                 <a:latin typeface="Arial"/>
               </a:rPr>
-              <a:t>_1]</a:t>
+              <a:t>hora_2,</a:t>
             </a:r>
             <a:r>
               <a:rPr lang="pt-BR" sz="1000" b="0" u="none" strike="noStrike" dirty="0">
@@ -3941,16 +3941,17 @@
                 <a:uFillTx/>
                 <a:latin typeface="Arial"/>
               </a:rPr>
-              <a:t> às [r_</a:t>
-            </a:r>
-            <a:r>
-              <a:rPr lang="pt-BR" sz="1000" dirty="0">
-                <a:solidFill>
-                  <a:srgbClr val="000000"/>
-                </a:solidFill>
-                <a:latin typeface="Arial"/>
-              </a:rPr>
-              <a:t>hora_2],</a:t>
+              <a:t> totalizando uma carga horária de </a:t>
+            </a:r>
+            <a:r>
+              <a:rPr lang="pt-BR" sz="1000" b="0" u="none" strike="noStrike" dirty="0" err="1">
+                <a:solidFill>
+                  <a:srgbClr val="000000"/>
+                </a:solidFill>
+                <a:uFillTx/>
+                <a:latin typeface="Arial"/>
+              </a:rPr>
+              <a:t>carga_hora</a:t>
             </a:r>
             <a:r>
               <a:rPr lang="pt-BR" sz="1000" b="0" u="none" strike="noStrike" dirty="0">
@@ -3960,27 +3961,7 @@
                 <a:uFillTx/>
                 <a:latin typeface="Arial"/>
               </a:rPr>
-              <a:t> totalizando uma carga horária de [</a:t>
-            </a:r>
-            <a:r>
-              <a:rPr lang="pt-BR" sz="1000" b="0" u="none" strike="noStrike" dirty="0" err="1">
-                <a:solidFill>
-                  <a:srgbClr val="000000"/>
-                </a:solidFill>
-                <a:uFillTx/>
-                <a:latin typeface="Arial"/>
-              </a:rPr>
-              <a:t>carga_hora</a:t>
-            </a:r>
-            <a:r>
-              <a:rPr lang="pt-BR" sz="1000" b="0" u="none" strike="noStrike" dirty="0">
-                <a:solidFill>
-                  <a:srgbClr val="000000"/>
-                </a:solidFill>
-                <a:uFillTx/>
-                <a:latin typeface="Arial"/>
-              </a:rPr>
-              <a:t>] horas/aula. O(a) participante foi avaliado(a) e considerado(a) apto(a) pelo instrutor e responsável técnica da capacitação.</a:t>
+              <a:t> horas/aula. O(a) participante foi avaliado(a) e considerado(a) apto(a) pelo instrutor e responsável técnica da capacitação.</a:t>
             </a:r>
             <a:endParaRPr lang="en-US" sz="1000" b="0" u="none" strike="noStrike" dirty="0">
               <a:solidFill>
@@ -4008,7 +3989,7 @@
                 </a:solidFill>
                 <a:latin typeface="Arial"/>
               </a:rPr>
-              <a:t>EMISSÃO DO CERTIFICADO DIA [</a:t>
+              <a:t>EMISSÃO DO CERTIFICADO DIA </a:t>
             </a:r>
             <a:r>
               <a:rPr lang="pt-BR" sz="1050" b="1" u="none" strike="noStrike" dirty="0" err="1">
@@ -4028,7 +4009,7 @@
                 <a:uFillTx/>
                 <a:latin typeface="Arial"/>
               </a:rPr>
-              <a:t>] </a:t>
+              <a:t> </a:t>
             </a:r>
             <a:r>
               <a:rPr lang="pt-BR" sz="1050" b="1" dirty="0">
@@ -4047,7 +4028,7 @@
                 <a:uFillTx/>
                 <a:latin typeface="Arial"/>
               </a:rPr>
-              <a:t> [</a:t>
+              <a:t> </a:t>
             </a:r>
             <a:r>
               <a:rPr lang="pt-BR" sz="1050" b="1" dirty="0" err="1">
@@ -4076,43 +4057,34 @@
                 <a:uFillTx/>
                 <a:latin typeface="Arial"/>
               </a:rPr>
-              <a:t>] DE 2024 – </a:t>
+              <a:t> DE 2024 – </a:t>
+            </a:r>
+            <a:r>
+              <a:rPr lang="pt-BR" sz="1050" b="1" dirty="0" err="1">
+                <a:solidFill>
+                  <a:srgbClr val="000000"/>
+                </a:solidFill>
+                <a:latin typeface="Arial"/>
+              </a:rPr>
+              <a:t>local</a:t>
+            </a:r>
+            <a:r>
+              <a:rPr lang="pt-BR" sz="1050" b="1" dirty="0" err="1">
+                <a:solidFill>
+                  <a:schemeClr val="dk1"/>
+                </a:solidFill>
+                <a:latin typeface="Arial"/>
+              </a:rPr>
+              <a:t>_emissao</a:t>
             </a:r>
             <a:r>
               <a:rPr lang="pt-BR" sz="1050" b="1" dirty="0">
                 <a:solidFill>
-                  <a:srgbClr val="000000"/>
-                </a:solidFill>
-                <a:latin typeface="Arial"/>
-              </a:rPr>
-              <a:t>[</a:t>
-            </a:r>
-            <a:r>
-              <a:rPr lang="pt-BR" sz="1050" b="1" dirty="0" err="1">
-                <a:solidFill>
-                  <a:srgbClr val="000000"/>
-                </a:solidFill>
-                <a:latin typeface="Arial"/>
-              </a:rPr>
-              <a:t>local</a:t>
-            </a:r>
-            <a:r>
-              <a:rPr lang="pt-BR" sz="1050" b="1" dirty="0" err="1">
-                <a:solidFill>
                   <a:schemeClr val="dk1"/>
                 </a:solidFill>
                 <a:latin typeface="Arial"/>
               </a:rPr>
-              <a:t>_emissao</a:t>
-            </a:r>
-            <a:r>
-              <a:rPr lang="pt-BR" sz="1050" b="1" dirty="0">
-                <a:solidFill>
-                  <a:schemeClr val="dk1"/>
-                </a:solidFill>
-                <a:latin typeface="Arial"/>
-              </a:rPr>
-              <a:t>].</a:t>
+              <a:t>.</a:t>
             </a:r>
             <a:endParaRPr lang="en-US" sz="1050" b="0" u="none" strike="noStrike" dirty="0">
               <a:solidFill>
@@ -4168,43 +4140,13 @@
               </a:lnSpc>
             </a:pPr>
             <a:r>
-              <a:rPr lang="pt-BR" sz="3600" b="1" u="sng" strike="noStrike" dirty="0">
+              <a:rPr lang="pt-BR" sz="3600" b="1" u="sng">
                 <a:solidFill>
                   <a:schemeClr val="dk1"/>
                 </a:solidFill>
-                <a:uFillTx/>
                 <a:latin typeface="Brush Script MT"/>
               </a:rPr>
-              <a:t>[</a:t>
-            </a:r>
-            <a:r>
-              <a:rPr lang="pt-BR" sz="3600" b="1" u="sng" dirty="0" err="1">
-                <a:solidFill>
-                  <a:schemeClr val="dk1"/>
-                </a:solidFill>
-                <a:latin typeface="Brush Script MT"/>
-              </a:rPr>
-              <a:t>nome</a:t>
-            </a:r>
-            <a:r>
-              <a:rPr lang="pt-BR" sz="3600" b="1" u="sng" strike="noStrike" dirty="0" err="1">
-                <a:solidFill>
-                  <a:schemeClr val="dk1"/>
-                </a:solidFill>
-                <a:uFillTx/>
-                <a:latin typeface="Brush Script MT"/>
-              </a:rPr>
-              <a:t>_participante</a:t>
-            </a:r>
-            <a:r>
-              <a:rPr lang="pt-BR" sz="3600" b="1" u="sng" strike="noStrike" dirty="0">
-                <a:solidFill>
-                  <a:schemeClr val="dk1"/>
-                </a:solidFill>
-                <a:uFillTx/>
-                <a:latin typeface="Brush Script MT"/>
-              </a:rPr>
-              <a:t>]</a:t>
+              <a:t>nome_participante</a:t>
             </a:r>
             <a:endParaRPr lang="en-US" sz="3600" b="0" u="none" strike="noStrike" dirty="0">
               <a:solidFill>
@@ -4286,7 +4228,7 @@
                 <a:uFillTx/>
                 <a:latin typeface="Arial"/>
               </a:rPr>
-              <a:t>STS  [</a:t>
+              <a:t>STS  </a:t>
             </a:r>
             <a:r>
               <a:rPr lang="pt-BR" sz="900" b="1" dirty="0" err="1">
@@ -4296,15 +4238,6 @@
                 <a:latin typeface="Arial"/>
               </a:rPr>
               <a:t>codigo</a:t>
-            </a:r>
-            <a:r>
-              <a:rPr lang="pt-BR" sz="900" b="1" dirty="0">
-                <a:solidFill>
-                  <a:srgbClr val="000000"/>
-                </a:solidFill>
-                <a:latin typeface="Arial"/>
-              </a:rPr>
-              <a:t>]</a:t>
             </a:r>
             <a:endParaRPr lang="en-US" sz="900" b="0" u="none" strike="noStrike" dirty="0">
               <a:solidFill>

</xml_diff>

<commit_message>
refactor: rename dataRealizada to datas_realizadas in Certificados component
</commit_message>
<xml_diff>
--- a/public/templates/frente.pptx
+++ b/public/templates/frente.pptx
@@ -3865,19 +3865,20 @@
                 <a:uFillTx/>
                 <a:latin typeface="Arial"/>
               </a:rPr>
-              <a:t>, e realizado no dia </a:t>
-            </a:r>
-            <a:r>
-              <a:rPr lang="pt-BR" sz="1000" dirty="0" err="1">
-                <a:solidFill>
-                  <a:srgbClr val="000000"/>
-                </a:solidFill>
+              <a:t>, e realizado </a:t>
+            </a:r>
+            <a:r>
+              <a:rPr lang="pt-BR" sz="1000" b="0" u="none" strike="noStrike">
+                <a:solidFill>
+                  <a:srgbClr val="000000"/>
+                </a:solidFill>
+                <a:uFillTx/>
                 <a:latin typeface="Arial"/>
               </a:rPr>
-              <a:t>data_realizada</a:t>
-            </a:r>
-            <a:r>
-              <a:rPr lang="pt-BR" sz="1000" dirty="0">
+              <a:t>datas_realizadas</a:t>
+            </a:r>
+            <a:r>
+              <a:rPr lang="pt-BR" sz="1000">
                 <a:solidFill>
                   <a:srgbClr val="000000"/>
                 </a:solidFill>
@@ -3886,6 +3887,16 @@
               <a:t>,</a:t>
             </a:r>
             <a:r>
+              <a:rPr lang="pt-BR" sz="1000" b="0" u="none" strike="noStrike">
+                <a:solidFill>
+                  <a:srgbClr val="000000"/>
+                </a:solidFill>
+                <a:uFillTx/>
+                <a:latin typeface="Arial"/>
+              </a:rPr>
+              <a:t> </a:t>
+            </a:r>
+            <a:r>
               <a:rPr lang="pt-BR" sz="1000" b="0" u="none" strike="noStrike" dirty="0">
                 <a:solidFill>
                   <a:srgbClr val="000000"/>
@@ -3893,45 +3904,7 @@
                 <a:uFillTx/>
                 <a:latin typeface="Arial"/>
               </a:rPr>
-              <a:t> das r_hora</a:t>
-            </a:r>
-            <a:r>
-              <a:rPr lang="pt-BR" sz="1000" dirty="0">
-                <a:solidFill>
-                  <a:srgbClr val="000000"/>
-                </a:solidFill>
-                <a:latin typeface="Arial"/>
-              </a:rPr>
-              <a:t>_1</a:t>
-            </a:r>
-            <a:r>
-              <a:rPr lang="pt-BR" sz="1000" b="0" u="none" strike="noStrike" dirty="0">
-                <a:solidFill>
-                  <a:srgbClr val="000000"/>
-                </a:solidFill>
-                <a:uFillTx/>
-                <a:latin typeface="Arial"/>
-              </a:rPr>
-              <a:t> às r_</a:t>
-            </a:r>
-            <a:r>
-              <a:rPr lang="pt-BR" sz="1000" dirty="0">
-                <a:solidFill>
-                  <a:srgbClr val="000000"/>
-                </a:solidFill>
-                <a:latin typeface="Arial"/>
-              </a:rPr>
-              <a:t>hora_2,</a:t>
-            </a:r>
-            <a:r>
-              <a:rPr lang="pt-BR" sz="1000" b="0" u="none" strike="noStrike" dirty="0">
-                <a:solidFill>
-                  <a:srgbClr val="000000"/>
-                </a:solidFill>
-                <a:uFillTx/>
-                <a:latin typeface="Arial"/>
-              </a:rPr>
-              <a:t> totalizando uma carga horária de </a:t>
+              <a:t>totalizando uma carga horária de </a:t>
             </a:r>
             <a:r>
               <a:rPr lang="pt-BR" sz="1000" b="0" u="none" strike="noStrike" dirty="0" err="1">

</xml_diff>

<commit_message>
refactor: update frente template for improved consistency and formatting
</commit_message>
<xml_diff>
--- a/public/templates/frente.pptx
+++ b/public/templates/frente.pptx
@@ -3825,7 +3825,46 @@
                 <a:uFillTx/>
                 <a:latin typeface="Arial"/>
               </a:rPr>
-              <a:t>Este treinamento foi patrocinado pela empresa </a:t>
+              <a:t>Este treinamento foi patrocinado pela </a:t>
+            </a:r>
+            <a:r>
+              <a:rPr lang="pt-BR" sz="1000" b="0" u="none" strike="noStrike">
+                <a:solidFill>
+                  <a:srgbClr val="000000"/>
+                </a:solidFill>
+                <a:uFillTx/>
+                <a:latin typeface="Arial"/>
+              </a:rPr>
+              <a:t>empresa </a:t>
+            </a:r>
+            <a:r>
+              <a:rPr lang="pt-BR" sz="1000">
+                <a:solidFill>
+                  <a:srgbClr val="000000"/>
+                </a:solidFill>
+                <a:latin typeface="Arial"/>
+              </a:rPr>
+              <a:t>contratante</a:t>
+            </a:r>
+            <a:r>
+              <a:rPr lang="pt-BR" sz="1000" b="0" u="none" strike="noStrike">
+                <a:solidFill>
+                  <a:srgbClr val="000000"/>
+                </a:solidFill>
+                <a:uFillTx/>
+                <a:latin typeface="Arial"/>
+              </a:rPr>
+              <a:t>, </a:t>
+            </a:r>
+            <a:r>
+              <a:rPr lang="pt-BR" sz="1000" b="0" u="none" strike="noStrike" dirty="0">
+                <a:solidFill>
+                  <a:srgbClr val="000000"/>
+                </a:solidFill>
+                <a:uFillTx/>
+                <a:latin typeface="Arial"/>
+              </a:rPr>
+              <a:t>inscrita no CNPJ: </a:t>
             </a:r>
             <a:r>
               <a:rPr lang="pt-BR" sz="1000" b="0" u="none" strike="noStrike" dirty="0" err="1">
@@ -3835,7 +3874,7 @@
                 <a:uFillTx/>
                 <a:latin typeface="Arial"/>
               </a:rPr>
-              <a:t>empresa</a:t>
+              <a:t>cnpj</a:t>
             </a:r>
             <a:r>
               <a:rPr lang="pt-BR" sz="1000" b="0" u="none" strike="noStrike" dirty="0">
@@ -3845,7 +3884,7 @@
                 <a:uFillTx/>
                 <a:latin typeface="Arial"/>
               </a:rPr>
-              <a:t>, inscrita no CNPJ: </a:t>
+              <a:t>, e realizado </a:t>
             </a:r>
             <a:r>
               <a:rPr lang="pt-BR" sz="1000" b="0" u="none" strike="noStrike" dirty="0" err="1">
@@ -3855,7 +3894,16 @@
                 <a:uFillTx/>
                 <a:latin typeface="Arial"/>
               </a:rPr>
-              <a:t>cnpj</a:t>
+              <a:t>datas_realizadas</a:t>
+            </a:r>
+            <a:r>
+              <a:rPr lang="pt-BR" sz="1000" dirty="0">
+                <a:solidFill>
+                  <a:srgbClr val="000000"/>
+                </a:solidFill>
+                <a:latin typeface="Arial"/>
+              </a:rPr>
+              <a:t>,</a:t>
             </a:r>
             <a:r>
               <a:rPr lang="pt-BR" sz="1000" b="0" u="none" strike="noStrike" dirty="0">
@@ -3865,46 +3913,7 @@
                 <a:uFillTx/>
                 <a:latin typeface="Arial"/>
               </a:rPr>
-              <a:t>, e realizado </a:t>
-            </a:r>
-            <a:r>
-              <a:rPr lang="pt-BR" sz="1000" b="0" u="none" strike="noStrike">
-                <a:solidFill>
-                  <a:srgbClr val="000000"/>
-                </a:solidFill>
-                <a:uFillTx/>
-                <a:latin typeface="Arial"/>
-              </a:rPr>
-              <a:t>datas_realizadas</a:t>
-            </a:r>
-            <a:r>
-              <a:rPr lang="pt-BR" sz="1000">
-                <a:solidFill>
-                  <a:srgbClr val="000000"/>
-                </a:solidFill>
-                <a:latin typeface="Arial"/>
-              </a:rPr>
-              <a:t>,</a:t>
-            </a:r>
-            <a:r>
-              <a:rPr lang="pt-BR" sz="1000" b="0" u="none" strike="noStrike">
-                <a:solidFill>
-                  <a:srgbClr val="000000"/>
-                </a:solidFill>
-                <a:uFillTx/>
-                <a:latin typeface="Arial"/>
-              </a:rPr>
-              <a:t> </a:t>
-            </a:r>
-            <a:r>
-              <a:rPr lang="pt-BR" sz="1000" b="0" u="none" strike="noStrike" dirty="0">
-                <a:solidFill>
-                  <a:srgbClr val="000000"/>
-                </a:solidFill>
-                <a:uFillTx/>
-                <a:latin typeface="Arial"/>
-              </a:rPr>
-              <a:t>totalizando uma carga horária de </a:t>
+              <a:t> totalizando uma carga horária de </a:t>
             </a:r>
             <a:r>
               <a:rPr lang="pt-BR" sz="1000" b="0" u="none" strike="noStrike" dirty="0" err="1">

</xml_diff>

<commit_message>
refactor: update certificate emission date handling in Certificados component
</commit_message>
<xml_diff>
--- a/public/templates/frente.pptx
+++ b/public/templates/frente.pptx
@@ -117,9 +117,7 @@
 <file path=ppt/revisionInfo.xml><?xml version="1.0" encoding="utf-8"?>
 <p1510:revInfo xmlns:a="http://schemas.openxmlformats.org/drawingml/2006/main" xmlns:r="http://schemas.openxmlformats.org/officeDocument/2006/relationships" xmlns:p1510="http://schemas.microsoft.com/office/powerpoint/2015/10/main">
   <p1510:revLst>
-    <p1510:client id="{7FB1797D-4785-4B36-AB4F-C6782B6EAF08}" v="1" dt="2025-02-09T19:02:45.188"/>
-    <p1510:client id="{A976FBDA-9DF7-45E9-A9CA-B99CB6C9B211}" v="100" dt="2025-02-09T19:29:04.761"/>
-    <p1510:client id="{CD7428BC-AC56-466E-8CFF-52CCC6C2E04F}" v="39" dt="2025-02-09T20:04:19.891"/>
+    <p1510:client id="{6A02EF53-8134-47CF-A504-620F4543F67D}" v="28" dt="2025-03-21T03:23:34.913"/>
   </p1510:revLst>
 </p1510:revInfo>
 </file>
@@ -3825,46 +3823,26 @@
                 <a:uFillTx/>
                 <a:latin typeface="Arial"/>
               </a:rPr>
-              <a:t>Este treinamento foi patrocinado pela </a:t>
-            </a:r>
-            <a:r>
-              <a:rPr lang="pt-BR" sz="1000" b="0" u="none" strike="noStrike">
-                <a:solidFill>
-                  <a:srgbClr val="000000"/>
-                </a:solidFill>
-                <a:uFillTx/>
+              <a:t>Este treinamento foi patrocinado pela empresa </a:t>
+            </a:r>
+            <a:r>
+              <a:rPr lang="pt-BR" sz="1000" dirty="0">
+                <a:solidFill>
+                  <a:srgbClr val="000000"/>
+                </a:solidFill>
                 <a:latin typeface="Arial"/>
               </a:rPr>
-              <a:t>empresa </a:t>
-            </a:r>
-            <a:r>
-              <a:rPr lang="pt-BR" sz="1000">
-                <a:solidFill>
-                  <a:srgbClr val="000000"/>
-                </a:solidFill>
+              <a:t>contratante</a:t>
+            </a:r>
+            <a:r>
+              <a:rPr lang="pt-BR" sz="1000" b="0" u="none" strike="noStrike" dirty="0">
+                <a:solidFill>
+                  <a:srgbClr val="000000"/>
+                </a:solidFill>
+                <a:uFillTx/>
                 <a:latin typeface="Arial"/>
               </a:rPr>
-              <a:t>contratante</a:t>
-            </a:r>
-            <a:r>
-              <a:rPr lang="pt-BR" sz="1000" b="0" u="none" strike="noStrike">
-                <a:solidFill>
-                  <a:srgbClr val="000000"/>
-                </a:solidFill>
-                <a:uFillTx/>
-                <a:latin typeface="Arial"/>
-              </a:rPr>
-              <a:t>, </a:t>
-            </a:r>
-            <a:r>
-              <a:rPr lang="pt-BR" sz="1000" b="0" u="none" strike="noStrike" dirty="0">
-                <a:solidFill>
-                  <a:srgbClr val="000000"/>
-                </a:solidFill>
-                <a:uFillTx/>
-                <a:latin typeface="Arial"/>
-              </a:rPr>
-              <a:t>inscrita no CNPJ: </a:t>
+              <a:t>, inscrita no CNPJ: </a:t>
             </a:r>
             <a:r>
               <a:rPr lang="pt-BR" sz="1000" b="0" u="none" strike="noStrike" dirty="0" err="1">
@@ -3990,7 +3968,7 @@
                 </a:solidFill>
                 <a:latin typeface="Arial"/>
               </a:rPr>
-              <a:t>DO</a:t>
+              <a:t>DE</a:t>
             </a:r>
             <a:r>
               <a:rPr lang="pt-BR" sz="1050" b="1" u="none" strike="noStrike" dirty="0">
@@ -4020,7 +3998,35 @@
                 <a:uFillTx/>
                 <a:latin typeface="Arial"/>
               </a:rPr>
-              <a:t> DE 2024 – </a:t>
+              <a:t> DE </a:t>
+            </a:r>
+            <a:r>
+              <a:rPr lang="pt-BR" sz="1050" b="1" dirty="0" err="1">
+                <a:solidFill>
+                  <a:srgbClr val="000000"/>
+                </a:solidFill>
+                <a:latin typeface="Arial"/>
+              </a:rPr>
+              <a:t>e_ano</a:t>
+            </a:r>
+            <a:r>
+              <a:rPr lang="pt-BR" sz="1050" b="1" dirty="0">
+                <a:solidFill>
+                  <a:srgbClr val="000000"/>
+                </a:solidFill>
+                <a:latin typeface="Arial"/>
+              </a:rPr>
+              <a:t> –</a:t>
+            </a:r>
+            <a:r>
+              <a:rPr lang="pt-BR" sz="1050" b="1" u="none" strike="noStrike" dirty="0">
+                <a:solidFill>
+                  <a:srgbClr val="000000"/>
+                </a:solidFill>
+                <a:uFillTx/>
+                <a:latin typeface="Arial"/>
+              </a:rPr>
+              <a:t> </a:t>
             </a:r>
             <a:r>
               <a:rPr lang="pt-BR" sz="1050" b="1" u="none" strike="noStrike" dirty="0" err="1">
@@ -4095,7 +4101,7 @@
               </a:lnSpc>
             </a:pPr>
             <a:r>
-              <a:rPr lang="pt-BR" sz="3600" b="1" u="sng">
+              <a:rPr lang="pt-BR" sz="3600" b="1" err="1">
                 <a:solidFill>
                   <a:schemeClr val="dk1"/>
                 </a:solidFill>
@@ -4103,12 +4109,13 @@
               </a:rPr>
               <a:t>nome_participante</a:t>
             </a:r>
-            <a:endParaRPr lang="en-US" sz="3600" b="0" u="none" strike="noStrike" dirty="0">
+            <a:endParaRPr lang="en-US" sz="3600" b="0" strike="noStrike">
               <a:solidFill>
                 <a:schemeClr val="dk1"/>
               </a:solidFill>
               <a:uFillTx/>
               <a:latin typeface="Arial"/>
+              <a:cs typeface="Arial"/>
             </a:endParaRPr>
           </a:p>
         </p:txBody>

</xml_diff>

<commit_message>
fix: update frente.pptx template for improved layout and design
</commit_message>
<xml_diff>
--- a/public/templates/frente.pptx
+++ b/public/templates/frente.pptx
@@ -3804,6 +3804,13 @@
                 <a:latin typeface="Arial"/>
               </a:rPr>
               <a:t>portaria_treinamento</a:t>
+            </a:r>
+            <a:r>
+              <a:rPr lang="pt-BR" sz="1000" u="none" strike="noStrike" dirty="0">
+                <a:uFillTx/>
+                <a:latin typeface="Arial"/>
+              </a:rPr>
+              <a:t>.</a:t>
             </a:r>
             <a:r>
               <a:rPr lang="pt-BR" sz="1000" b="0" u="none" strike="noStrike" dirty="0">

</xml_diff>